<commit_message>
Start of publication sample
</commit_message>
<xml_diff>
--- a/DITA for Publishers scenario.pptx
+++ b/DITA for Publishers scenario.pptx
@@ -117,7 +117,7 @@
   </p:defaultTextStyle>
   <p:extLst>
     <p:ext uri="{EFAFB233-063F-42B5-8137-9DF3F51BA10A}">
-      <p15:sldGuideLst xmlns:p15="http://schemas.microsoft.com/office/powerpoint/2012/main" xmlns="">
+      <p15:sldGuideLst xmlns="" xmlns:p15="http://schemas.microsoft.com/office/powerpoint/2012/main">
         <p15:guide id="1" orient="horz" pos="2160" userDrawn="1">
           <p15:clr>
             <a:srgbClr val="A4A3A4"/>
@@ -131,7 +131,7 @@
       </p15:sldGuideLst>
     </p:ext>
     <p:ext uri="{2D200454-40CA-4A62-9FC3-DE9A4176ACB9}">
-      <p15:notesGuideLst xmlns:p15="http://schemas.microsoft.com/office/powerpoint/2012/main" xmlns=""/>
+      <p15:notesGuideLst xmlns="" xmlns:p15="http://schemas.microsoft.com/office/powerpoint/2012/main"/>
     </p:ext>
   </p:extLst>
 </p:presentation>
@@ -3499,35 +3499,35 @@
           <a:p>
             <a:pPr lvl="0"/>
             <a:r>
-              <a:rPr lang="en-US" smtClean="0"/>
+              <a:rPr lang="en-US" dirty="0" smtClean="0"/>
               <a:t>Click to edit Master text styles</a:t>
             </a:r>
           </a:p>
           <a:p>
             <a:pPr lvl="1"/>
             <a:r>
-              <a:rPr lang="en-US" smtClean="0"/>
+              <a:rPr lang="en-US" dirty="0" smtClean="0"/>
               <a:t>Second level</a:t>
             </a:r>
           </a:p>
           <a:p>
             <a:pPr lvl="2"/>
             <a:r>
-              <a:rPr lang="en-US" smtClean="0"/>
+              <a:rPr lang="en-US" dirty="0" smtClean="0"/>
               <a:t>Third level</a:t>
             </a:r>
           </a:p>
           <a:p>
             <a:pPr lvl="3"/>
             <a:r>
-              <a:rPr lang="en-US" smtClean="0"/>
+              <a:rPr lang="en-US" dirty="0" smtClean="0"/>
               <a:t>Fourth level</a:t>
             </a:r>
           </a:p>
           <a:p>
             <a:pPr lvl="4"/>
             <a:r>
-              <a:rPr lang="en-US" smtClean="0"/>
+              <a:rPr lang="en-US" dirty="0" smtClean="0"/>
               <a:t>Fifth level</a:t>
             </a:r>
             <a:endParaRPr dirty="0"/>
@@ -3721,7 +3721,7 @@
     <p:bodyStyle>
       <a:lvl1pPr marL="274325" indent="-228604" algn="l" defTabSz="914415" rtl="0" eaLnBrk="1" latinLnBrk="0" hangingPunct="1">
         <a:lnSpc>
-          <a:spcPct val="90000"/>
+          <a:spcPct val="100000"/>
         </a:lnSpc>
         <a:spcBef>
           <a:spcPts val="1800"/>
@@ -4034,7 +4034,7 @@
   </p:txStyles>
   <p:extLst mod="1">
     <p:ext uri="{27BBF7A9-308A-43DC-89C8-2F10F3537804}">
-      <p15:sldGuideLst xmlns:p15="http://schemas.microsoft.com/office/powerpoint/2012/main" xmlns="">
+      <p15:sldGuideLst xmlns="" xmlns:p15="http://schemas.microsoft.com/office/powerpoint/2012/main">
         <p15:guide id="1" pos="3839" userDrawn="1">
           <p15:clr>
             <a:srgbClr val="F26B43"/>
@@ -4550,12 +4550,7 @@
             <p:ph type="title"/>
           </p:nvPr>
         </p:nvSpPr>
-        <p:spPr>
-          <a:xfrm>
-            <a:off x="521072" y="448056"/>
-            <a:ext cx="10537337" cy="640080"/>
-          </a:xfrm>
-        </p:spPr>
+        <p:spPr/>
         <p:txBody>
           <a:bodyPr>
             <a:noAutofit/>
@@ -4586,95 +4581,81 @@
       </p:sp>
       <p:sp>
         <p:nvSpPr>
-          <p:cNvPr id="4" name="TextBox 3"/>
-          <p:cNvSpPr txBox="1"/>
-          <p:nvPr/>
-        </p:nvSpPr>
-        <p:spPr>
-          <a:xfrm>
-            <a:off x="1399066" y="1716258"/>
-            <a:ext cx="8624919" cy="3785652"/>
-          </a:xfrm>
-          <a:prstGeom prst="rect">
-            <a:avLst/>
-          </a:prstGeom>
-          <a:noFill/>
-        </p:spPr>
-        <p:txBody>
-          <a:bodyPr wrap="square" rtlCol="0">
-            <a:spAutoFit/>
+          <p:cNvPr id="7" name="Content Placeholder 6"/>
+          <p:cNvSpPr>
+            <a:spLocks noGrp="1"/>
+          </p:cNvSpPr>
+          <p:nvPr>
+            <p:ph idx="1"/>
+          </p:nvPr>
+        </p:nvSpPr>
+        <p:spPr/>
+        <p:txBody>
+          <a:bodyPr>
+            <a:normAutofit/>
           </a:bodyPr>
           <a:lstStyle/>
           <a:p>
             <a:r>
-              <a:rPr lang="en-US" sz="2000" dirty="0" err="1"/>
+              <a:rPr lang="en-US" dirty="0" err="1"/>
               <a:t>NetCo</a:t>
             </a:r>
             <a:r>
-              <a:rPr lang="en-US" sz="2000" dirty="0"/>
+              <a:rPr lang="en-US" dirty="0"/>
               <a:t> Limited is a customer of Thunderbird; it wants to add their content to Thunderbird + </a:t>
             </a:r>
             <a:r>
-              <a:rPr lang="en-US" sz="2000" dirty="0" err="1"/>
+              <a:rPr lang="en-US" dirty="0" err="1"/>
               <a:t>HawkVision</a:t>
             </a:r>
             <a:r>
-              <a:rPr lang="en-US" sz="2000" dirty="0"/>
-              <a:t> and publish their content to EPUB for use by field technicians who will be viewing content on </a:t>
-            </a:r>
-            <a:r>
-              <a:rPr lang="en-US" sz="2000" dirty="0" smtClean="0"/>
-              <a:t>hand</a:t>
-            </a:r>
-            <a:r>
-              <a:rPr lang="en-US" sz="2000" dirty="0"/>
-              <a:t>-held </a:t>
-            </a:r>
-            <a:r>
-              <a:rPr lang="en-US" sz="2000" dirty="0" smtClean="0"/>
-              <a:t>devices.</a:t>
-            </a:r>
-            <a:endParaRPr lang="en-US" sz="2000" dirty="0"/>
-          </a:p>
-          <a:p>
-            <a:endParaRPr lang="en-US" sz="2000" dirty="0"/>
-          </a:p>
-          <a:p>
-            <a:r>
-              <a:rPr lang="en-US" sz="2000" dirty="0"/>
-              <a:t>They decide to use DITA for Publishers to generate EPUB.</a:t>
-            </a:r>
-          </a:p>
-          <a:p>
-            <a:endParaRPr lang="en-US" sz="2000" dirty="0"/>
-          </a:p>
-          <a:p>
-            <a:r>
-              <a:rPr lang="en-US" sz="2000" dirty="0" err="1"/>
+              <a:rPr lang="en-US" dirty="0"/>
+              <a:t> and publish their content to EPUB for use by field technicians who will be viewing content on hand-held devices</a:t>
+            </a:r>
+            <a:r>
+              <a:rPr lang="en-US" dirty="0" smtClean="0"/>
+              <a:t>.</a:t>
+            </a:r>
+            <a:endParaRPr lang="en-US" dirty="0"/>
+          </a:p>
+          <a:p>
+            <a:r>
+              <a:rPr lang="en-US" dirty="0"/>
+              <a:t>They decide to use DITA for Publishers to generate EPUB</a:t>
+            </a:r>
+            <a:r>
+              <a:rPr lang="en-US" dirty="0" smtClean="0"/>
+              <a:t>.</a:t>
+            </a:r>
+            <a:endParaRPr lang="en-US" dirty="0"/>
+          </a:p>
+          <a:p>
+            <a:r>
+              <a:rPr lang="en-US" dirty="0" err="1"/>
               <a:t>NetCo</a:t>
             </a:r>
             <a:r>
-              <a:rPr lang="en-US" sz="2000" dirty="0"/>
+              <a:rPr lang="en-US" dirty="0"/>
               <a:t> receives the source content from Thunderbird, who exported it from their CMS as a ZIP file. They also shared the DTD files for the specialized marketing FAQ</a:t>
             </a:r>
             <a:r>
-              <a:rPr lang="en-US" sz="2000" dirty="0" smtClean="0"/>
+              <a:rPr lang="en-US" dirty="0" smtClean="0"/>
               <a:t>.</a:t>
             </a:r>
-          </a:p>
-          <a:p>
-            <a:endParaRPr lang="en-US" sz="2000" dirty="0"/>
-          </a:p>
-          <a:p>
-            <a:r>
-              <a:rPr lang="en-US" sz="2000" dirty="0" err="1" smtClean="0"/>
+            <a:endParaRPr lang="en-US" dirty="0"/>
+          </a:p>
+          <a:p>
+            <a:r>
+              <a:rPr lang="en-US" dirty="0" err="1"/>
               <a:t>NetCo</a:t>
             </a:r>
             <a:r>
-              <a:rPr lang="en-US" sz="2000" dirty="0" smtClean="0"/>
+              <a:rPr lang="en-US" dirty="0"/>
               <a:t> also adds their own content specific to the needs of their field technicians.</a:t>
             </a:r>
-            <a:endParaRPr lang="en-US" sz="2000" dirty="0"/>
+          </a:p>
+          <a:p>
+            <a:endParaRPr lang="en-US" dirty="0"/>
           </a:p>
         </p:txBody>
       </p:sp>
@@ -5220,95 +5201,15 @@
       </p:sp>
       <p:sp>
         <p:nvSpPr>
-          <p:cNvPr id="13" name="Content Placeholder 12"/>
+          <p:cNvPr id="2" name="Title 1"/>
           <p:cNvSpPr>
             <a:spLocks noGrp="1"/>
           </p:cNvSpPr>
           <p:nvPr>
-            <p:ph sz="half" idx="4294967295"/>
-          </p:nvPr>
-        </p:nvSpPr>
-        <p:spPr>
-          <a:xfrm>
-            <a:off x="541470" y="2013155"/>
-            <a:ext cx="11573162" cy="3396130"/>
-          </a:xfrm>
-          <a:prstGeom prst="rect">
-            <a:avLst/>
-          </a:prstGeom>
-        </p:spPr>
-        <p:txBody>
-          <a:bodyPr>
-            <a:normAutofit/>
-          </a:bodyPr>
-          <a:lstStyle/>
-          <a:p>
-            <a:pPr>
-              <a:lnSpc>
-                <a:spcPct val="200000"/>
-              </a:lnSpc>
-              <a:buFont typeface="+mj-lt"/>
-              <a:buAutoNum type="arabicPeriod"/>
-            </a:pPr>
-            <a:r>
-              <a:rPr lang="en-US" sz="2400" dirty="0"/>
-              <a:t> Install DTDs.</a:t>
-            </a:r>
-          </a:p>
-          <a:p>
-            <a:pPr>
-              <a:lnSpc>
-                <a:spcPct val="200000"/>
-              </a:lnSpc>
-              <a:buFont typeface="+mj-lt"/>
-              <a:buAutoNum type="arabicPeriod"/>
-            </a:pPr>
-            <a:r>
-              <a:rPr lang="en-US" sz="2400" dirty="0"/>
-              <a:t> Create a master publication that aggregates content from the two </a:t>
-            </a:r>
-            <a:r>
-              <a:rPr lang="en-US" sz="2400" dirty="0" smtClean="0"/>
-              <a:t>companies.</a:t>
-            </a:r>
-            <a:endParaRPr lang="en-US" sz="2400" dirty="0"/>
-          </a:p>
-          <a:p>
-            <a:pPr>
-              <a:lnSpc>
-                <a:spcPct val="200000"/>
-              </a:lnSpc>
-              <a:buFont typeface="+mj-lt"/>
-              <a:buAutoNum type="arabicPeriod"/>
-            </a:pPr>
-            <a:r>
-              <a:rPr lang="en-US" sz="2400" dirty="0"/>
-              <a:t> Generate </a:t>
-            </a:r>
-            <a:r>
-              <a:rPr lang="en-US" sz="2400" dirty="0" smtClean="0"/>
-              <a:t>EPUB.</a:t>
-            </a:r>
-            <a:endParaRPr lang="en-US" sz="2400" dirty="0"/>
-          </a:p>
-        </p:txBody>
-      </p:sp>
-      <p:sp>
-        <p:nvSpPr>
-          <p:cNvPr id="2" name="Title 1"/>
-          <p:cNvSpPr>
-            <a:spLocks noGrp="1"/>
-          </p:cNvSpPr>
-          <p:nvPr>
             <p:ph type="title"/>
           </p:nvPr>
         </p:nvSpPr>
-        <p:spPr>
-          <a:xfrm>
-            <a:off x="521072" y="448056"/>
-            <a:ext cx="10537337" cy="640080"/>
-          </a:xfrm>
-        </p:spPr>
+        <p:spPr/>
         <p:txBody>
           <a:bodyPr>
             <a:noAutofit/>
@@ -5323,6 +5224,58 @@
               </a:rPr>
               <a:t>Publishing aggregated content</a:t>
             </a:r>
+          </a:p>
+        </p:txBody>
+      </p:sp>
+      <p:sp>
+        <p:nvSpPr>
+          <p:cNvPr id="4" name="Content Placeholder 3"/>
+          <p:cNvSpPr>
+            <a:spLocks noGrp="1"/>
+          </p:cNvSpPr>
+          <p:nvPr>
+            <p:ph idx="1"/>
+          </p:nvPr>
+        </p:nvSpPr>
+        <p:spPr/>
+        <p:txBody>
+          <a:bodyPr/>
+          <a:lstStyle/>
+          <a:p>
+            <a:pPr>
+              <a:buFont typeface="+mj-lt"/>
+              <a:buAutoNum type="arabicPeriod"/>
+            </a:pPr>
+            <a:r>
+              <a:rPr lang="en-US" dirty="0"/>
+              <a:t> Install DTDs.</a:t>
+            </a:r>
+          </a:p>
+          <a:p>
+            <a:pPr>
+              <a:buFont typeface="+mj-lt"/>
+              <a:buAutoNum type="arabicPeriod"/>
+            </a:pPr>
+            <a:r>
+              <a:rPr lang="en-US" dirty="0"/>
+              <a:t> Create a master publication that aggregates content from the two companies.</a:t>
+            </a:r>
+          </a:p>
+          <a:p>
+            <a:pPr>
+              <a:buFont typeface="+mj-lt"/>
+              <a:buAutoNum type="arabicPeriod"/>
+            </a:pPr>
+            <a:r>
+              <a:rPr lang="en-US" dirty="0"/>
+              <a:t> Generate EPUB.</a:t>
+            </a:r>
+          </a:p>
+          <a:p>
+            <a:pPr marL="45721" indent="0">
+              <a:buNone/>
+            </a:pPr>
+            <a:endParaRPr lang="en-US" dirty="0"/>
           </a:p>
         </p:txBody>
       </p:sp>
@@ -5871,86 +5824,15 @@
       </p:sp>
       <p:sp>
         <p:nvSpPr>
-          <p:cNvPr id="13" name="Content Placeholder 12"/>
+          <p:cNvPr id="2" name="Title 1"/>
           <p:cNvSpPr>
             <a:spLocks noGrp="1"/>
           </p:cNvSpPr>
           <p:nvPr>
-            <p:ph sz="half" idx="4294967295"/>
-          </p:nvPr>
-        </p:nvSpPr>
-        <p:spPr>
-          <a:xfrm>
-            <a:off x="541470" y="2013155"/>
-            <a:ext cx="6897153" cy="3396130"/>
-          </a:xfrm>
-          <a:prstGeom prst="rect">
-            <a:avLst/>
-          </a:prstGeom>
-        </p:spPr>
-        <p:txBody>
-          <a:bodyPr>
-            <a:normAutofit fontScale="85000" lnSpcReduction="10000"/>
-          </a:bodyPr>
-          <a:lstStyle/>
-          <a:p>
-            <a:pPr>
-              <a:lnSpc>
-                <a:spcPct val="200000"/>
-              </a:lnSpc>
-              <a:buFont typeface="+mj-lt"/>
-              <a:buAutoNum type="arabicPeriod"/>
-            </a:pPr>
-            <a:r>
-              <a:rPr lang="en-US" sz="2400" dirty="0" smtClean="0"/>
-              <a:t>Get the Open Toolkit plugins with the DTDs</a:t>
-            </a:r>
-          </a:p>
-          <a:p>
-            <a:pPr>
-              <a:lnSpc>
-                <a:spcPct val="200000"/>
-              </a:lnSpc>
-              <a:buFont typeface="+mj-lt"/>
-              <a:buAutoNum type="arabicPeriod"/>
-            </a:pPr>
-            <a:r>
-              <a:rPr lang="en-US" sz="2400" dirty="0" smtClean="0"/>
-              <a:t>Copy the plugins to the Open Toolkit’s plugins/ directory</a:t>
-            </a:r>
-          </a:p>
-          <a:p>
-            <a:pPr>
-              <a:lnSpc>
-                <a:spcPct val="200000"/>
-              </a:lnSpc>
-              <a:buFont typeface="+mj-lt"/>
-              <a:buAutoNum type="arabicPeriod"/>
-            </a:pPr>
-            <a:r>
-              <a:rPr lang="en-US" sz="2400" dirty="0" smtClean="0"/>
-              <a:t>Run the Open Toolkit “integration” action to make the new plugin usable.</a:t>
-            </a:r>
-            <a:endParaRPr lang="en-US" sz="2400" dirty="0"/>
-          </a:p>
-        </p:txBody>
-      </p:sp>
-      <p:sp>
-        <p:nvSpPr>
-          <p:cNvPr id="2" name="Title 1"/>
-          <p:cNvSpPr>
-            <a:spLocks noGrp="1"/>
-          </p:cNvSpPr>
-          <p:nvPr>
             <p:ph type="title"/>
           </p:nvPr>
         </p:nvSpPr>
-        <p:spPr>
-          <a:xfrm>
-            <a:off x="521072" y="448056"/>
-            <a:ext cx="10537337" cy="640080"/>
-          </a:xfrm>
-        </p:spPr>
+        <p:spPr/>
         <p:txBody>
           <a:bodyPr>
             <a:noAutofit/>
@@ -5965,6 +5847,59 @@
               </a:rPr>
               <a:t>Install DTDs</a:t>
             </a:r>
+          </a:p>
+        </p:txBody>
+      </p:sp>
+      <p:sp>
+        <p:nvSpPr>
+          <p:cNvPr id="13" name="Content Placeholder 12"/>
+          <p:cNvSpPr>
+            <a:spLocks noGrp="1"/>
+          </p:cNvSpPr>
+          <p:nvPr>
+            <p:ph idx="1"/>
+          </p:nvPr>
+        </p:nvSpPr>
+        <p:spPr>
+          <a:prstGeom prst="rect">
+            <a:avLst/>
+          </a:prstGeom>
+        </p:spPr>
+        <p:txBody>
+          <a:bodyPr>
+            <a:normAutofit/>
+          </a:bodyPr>
+          <a:lstStyle/>
+          <a:p>
+            <a:pPr>
+              <a:buFont typeface="+mj-lt"/>
+              <a:buAutoNum type="arabicPeriod"/>
+            </a:pPr>
+            <a:r>
+              <a:rPr lang="en-US" sz="2400" dirty="0" smtClean="0"/>
+              <a:t>Get the Open Toolkit plugins with the DTDs</a:t>
+            </a:r>
+          </a:p>
+          <a:p>
+            <a:pPr>
+              <a:buFont typeface="+mj-lt"/>
+              <a:buAutoNum type="arabicPeriod"/>
+            </a:pPr>
+            <a:r>
+              <a:rPr lang="en-US" sz="2400" dirty="0" smtClean="0"/>
+              <a:t>Copy the plugins to the Open Toolkit’s plugins/ directory</a:t>
+            </a:r>
+          </a:p>
+          <a:p>
+            <a:pPr>
+              <a:buFont typeface="+mj-lt"/>
+              <a:buAutoNum type="arabicPeriod"/>
+            </a:pPr>
+            <a:r>
+              <a:rPr lang="en-US" sz="2400" dirty="0" smtClean="0"/>
+              <a:t>Run the Open Toolkit “integration” action to make the new plugin usable.</a:t>
+            </a:r>
+            <a:endParaRPr lang="en-US" sz="2400" dirty="0"/>
           </a:p>
         </p:txBody>
       </p:sp>
@@ -6480,110 +6415,15 @@
       </p:sp>
       <p:sp>
         <p:nvSpPr>
-          <p:cNvPr id="13" name="Content Placeholder 12"/>
+          <p:cNvPr id="2" name="Title 1"/>
           <p:cNvSpPr>
             <a:spLocks noGrp="1"/>
           </p:cNvSpPr>
           <p:nvPr>
-            <p:ph sz="half" idx="4294967295"/>
-          </p:nvPr>
-        </p:nvSpPr>
-        <p:spPr>
-          <a:xfrm>
-            <a:off x="541470" y="2013155"/>
-            <a:ext cx="6897153" cy="3396130"/>
-          </a:xfrm>
-          <a:prstGeom prst="rect">
-            <a:avLst/>
-          </a:prstGeom>
-        </p:spPr>
-        <p:txBody>
-          <a:bodyPr>
-            <a:normAutofit fontScale="85000" lnSpcReduction="20000"/>
-          </a:bodyPr>
-          <a:lstStyle/>
-          <a:p>
-            <a:pPr>
-              <a:lnSpc>
-                <a:spcPct val="200000"/>
-              </a:lnSpc>
-              <a:buFont typeface="+mj-lt"/>
-              <a:buAutoNum type="arabicPeriod"/>
-            </a:pPr>
-            <a:r>
-              <a:rPr lang="en-US" sz="2400" dirty="0" smtClean="0"/>
-              <a:t>Add </a:t>
-            </a:r>
-            <a:r>
-              <a:rPr lang="en-US" sz="2400" dirty="0" err="1" smtClean="0"/>
-              <a:t>Thunderbird+HawkVision</a:t>
-            </a:r>
-            <a:r>
-              <a:rPr lang="en-US" sz="2400" dirty="0" smtClean="0"/>
-              <a:t> content to local documentation repository</a:t>
-            </a:r>
-          </a:p>
-          <a:p>
-            <a:pPr>
-              <a:lnSpc>
-                <a:spcPct val="200000"/>
-              </a:lnSpc>
-              <a:buFont typeface="+mj-lt"/>
-              <a:buAutoNum type="arabicPeriod"/>
-            </a:pPr>
-            <a:r>
-              <a:rPr lang="en-US" sz="2400" dirty="0" smtClean="0"/>
-              <a:t>Create a new DITA map for the custom publication</a:t>
-            </a:r>
-          </a:p>
-          <a:p>
-            <a:pPr>
-              <a:lnSpc>
-                <a:spcPct val="200000"/>
-              </a:lnSpc>
-              <a:buFont typeface="+mj-lt"/>
-              <a:buAutoNum type="arabicPeriod"/>
-            </a:pPr>
-            <a:r>
-              <a:rPr lang="en-US" sz="2400" dirty="0" smtClean="0"/>
-              <a:t>Create a reference to the </a:t>
-            </a:r>
-            <a:r>
-              <a:rPr lang="en-US" sz="2400" dirty="0" err="1" smtClean="0"/>
-              <a:t>Thunderbird+HawkVision</a:t>
-            </a:r>
-            <a:r>
-              <a:rPr lang="en-US" sz="2400" dirty="0" smtClean="0"/>
-              <a:t> map and to the </a:t>
-            </a:r>
-            <a:r>
-              <a:rPr lang="en-US" sz="2400" dirty="0" err="1" smtClean="0"/>
-              <a:t>NetCo</a:t>
-            </a:r>
-            <a:r>
-              <a:rPr lang="en-US" sz="2400" dirty="0" smtClean="0"/>
-              <a:t>-specific content.</a:t>
-            </a:r>
-            <a:endParaRPr lang="en-US" sz="2400" dirty="0"/>
-          </a:p>
-        </p:txBody>
-      </p:sp>
-      <p:sp>
-        <p:nvSpPr>
-          <p:cNvPr id="2" name="Title 1"/>
-          <p:cNvSpPr>
-            <a:spLocks noGrp="1"/>
-          </p:cNvSpPr>
-          <p:nvPr>
             <p:ph type="title"/>
           </p:nvPr>
         </p:nvSpPr>
-        <p:spPr>
-          <a:xfrm>
-            <a:off x="521072" y="448056"/>
-            <a:ext cx="10537337" cy="640080"/>
-          </a:xfrm>
-        </p:spPr>
+        <p:spPr/>
         <p:txBody>
           <a:bodyPr>
             <a:noAutofit/>
@@ -6598,6 +6438,92 @@
               </a:rPr>
               <a:t>Create a single publication</a:t>
             </a:r>
+          </a:p>
+        </p:txBody>
+      </p:sp>
+      <p:sp>
+        <p:nvSpPr>
+          <p:cNvPr id="13" name="Content Placeholder 12"/>
+          <p:cNvSpPr>
+            <a:spLocks noGrp="1"/>
+          </p:cNvSpPr>
+          <p:nvPr>
+            <p:ph idx="1"/>
+          </p:nvPr>
+        </p:nvSpPr>
+        <p:spPr>
+          <a:prstGeom prst="rect">
+            <a:avLst/>
+          </a:prstGeom>
+        </p:spPr>
+        <p:txBody>
+          <a:bodyPr>
+            <a:normAutofit/>
+          </a:bodyPr>
+          <a:lstStyle/>
+          <a:p>
+            <a:pPr>
+              <a:lnSpc>
+                <a:spcPct val="110000"/>
+              </a:lnSpc>
+              <a:buFont typeface="+mj-lt"/>
+              <a:buAutoNum type="arabicPeriod"/>
+            </a:pPr>
+            <a:r>
+              <a:rPr lang="en-US" sz="2400" dirty="0" smtClean="0"/>
+              <a:t>Add </a:t>
+            </a:r>
+            <a:r>
+              <a:rPr lang="en-US" sz="2400" dirty="0" err="1" smtClean="0"/>
+              <a:t>Thunderbird+HawkVision</a:t>
+            </a:r>
+            <a:r>
+              <a:rPr lang="en-US" sz="2400" dirty="0" smtClean="0"/>
+              <a:t> content to local documentation repository</a:t>
+            </a:r>
+          </a:p>
+          <a:p>
+            <a:pPr>
+              <a:lnSpc>
+                <a:spcPct val="110000"/>
+              </a:lnSpc>
+              <a:buFont typeface="+mj-lt"/>
+              <a:buAutoNum type="arabicPeriod"/>
+            </a:pPr>
+            <a:r>
+              <a:rPr lang="en-US" sz="2400" dirty="0" smtClean="0"/>
+              <a:t>Create a new DITA map for the custom publication</a:t>
+            </a:r>
+          </a:p>
+          <a:p>
+            <a:pPr>
+              <a:lnSpc>
+                <a:spcPct val="110000"/>
+              </a:lnSpc>
+              <a:buFont typeface="+mj-lt"/>
+              <a:buAutoNum type="arabicPeriod"/>
+            </a:pPr>
+            <a:r>
+              <a:rPr lang="en-US" sz="2400" dirty="0" smtClean="0"/>
+              <a:t>Create a reference to the </a:t>
+            </a:r>
+            <a:r>
+              <a:rPr lang="en-US" sz="2400" dirty="0" err="1" smtClean="0"/>
+              <a:t>Thunderbird+HawkVision</a:t>
+            </a:r>
+            <a:r>
+              <a:rPr lang="en-US" sz="2400" dirty="0" smtClean="0"/>
+              <a:t> map and to the </a:t>
+            </a:r>
+            <a:r>
+              <a:rPr lang="en-US" sz="2400" dirty="0" err="1" smtClean="0"/>
+              <a:t>NetCo</a:t>
+            </a:r>
+            <a:r>
+              <a:rPr lang="en-US" sz="2400" dirty="0" smtClean="0"/>
+              <a:t>-specific content.</a:t>
+            </a:r>
+            <a:endParaRPr lang="en-US" sz="2400" dirty="0"/>
           </a:p>
         </p:txBody>
       </p:sp>
@@ -7113,88 +7039,15 @@
       </p:sp>
       <p:sp>
         <p:nvSpPr>
-          <p:cNvPr id="13" name="Content Placeholder 12"/>
+          <p:cNvPr id="2" name="Title 1"/>
           <p:cNvSpPr>
             <a:spLocks noGrp="1"/>
           </p:cNvSpPr>
           <p:nvPr>
-            <p:ph sz="half" idx="4294967295"/>
-          </p:nvPr>
-        </p:nvSpPr>
-        <p:spPr>
-          <a:xfrm>
-            <a:off x="541470" y="2013155"/>
-            <a:ext cx="6897153" cy="3396130"/>
-          </a:xfrm>
-          <a:prstGeom prst="rect">
-            <a:avLst/>
-          </a:prstGeom>
-        </p:spPr>
-        <p:txBody>
-          <a:bodyPr>
-            <a:normAutofit fontScale="92500" lnSpcReduction="20000"/>
-          </a:bodyPr>
-          <a:lstStyle/>
-          <a:p>
-            <a:pPr>
-              <a:lnSpc>
-                <a:spcPct val="200000"/>
-              </a:lnSpc>
-              <a:buFont typeface="+mj-lt"/>
-              <a:buAutoNum type="arabicPeriod"/>
-            </a:pPr>
-            <a:r>
-              <a:rPr lang="en-US" sz="2400" dirty="0" smtClean="0"/>
-              <a:t>One-time setup: Install the DITA for Publishers EPUB plugin to the DITA Open Toolkit (out of the box with </a:t>
-            </a:r>
-            <a:r>
-              <a:rPr lang="en-US" sz="2400" dirty="0" err="1" smtClean="0"/>
-              <a:t>oXygenXML</a:t>
-            </a:r>
-            <a:r>
-              <a:rPr lang="en-US" sz="2400" dirty="0" smtClean="0"/>
-              <a:t>)</a:t>
-            </a:r>
-          </a:p>
-          <a:p>
-            <a:pPr>
-              <a:lnSpc>
-                <a:spcPct val="200000"/>
-              </a:lnSpc>
-              <a:buFont typeface="+mj-lt"/>
-              <a:buAutoNum type="arabicPeriod"/>
-            </a:pPr>
-            <a:r>
-              <a:rPr lang="en-US" sz="2400" dirty="0" smtClean="0"/>
-              <a:t>Run the Open Toolkit “</a:t>
-            </a:r>
-            <a:r>
-              <a:rPr lang="en-US" sz="2400" dirty="0" err="1" smtClean="0"/>
-              <a:t>epub</a:t>
-            </a:r>
-            <a:r>
-              <a:rPr lang="en-US" sz="2400" dirty="0" smtClean="0"/>
-              <a:t>” transformation type against the publication map.</a:t>
-            </a:r>
-          </a:p>
-        </p:txBody>
-      </p:sp>
-      <p:sp>
-        <p:nvSpPr>
-          <p:cNvPr id="2" name="Title 1"/>
-          <p:cNvSpPr>
-            <a:spLocks noGrp="1"/>
-          </p:cNvSpPr>
-          <p:nvPr>
             <p:ph type="title"/>
           </p:nvPr>
         </p:nvSpPr>
-        <p:spPr>
-          <a:xfrm>
-            <a:off x="521072" y="448056"/>
-            <a:ext cx="10537337" cy="640080"/>
-          </a:xfrm>
-        </p:spPr>
+        <p:spPr/>
         <p:txBody>
           <a:bodyPr>
             <a:noAutofit/>
@@ -7208,6 +7061,64 @@
                 <a:cs typeface="Segoe UI Light" panose="020B0502040204020203" pitchFamily="34" charset="0"/>
               </a:rPr>
               <a:t>Generate an EPUB</a:t>
+            </a:r>
+          </a:p>
+        </p:txBody>
+      </p:sp>
+      <p:sp>
+        <p:nvSpPr>
+          <p:cNvPr id="13" name="Content Placeholder 12"/>
+          <p:cNvSpPr>
+            <a:spLocks noGrp="1"/>
+          </p:cNvSpPr>
+          <p:nvPr>
+            <p:ph idx="1"/>
+          </p:nvPr>
+        </p:nvSpPr>
+        <p:spPr>
+          <a:prstGeom prst="rect">
+            <a:avLst/>
+          </a:prstGeom>
+        </p:spPr>
+        <p:txBody>
+          <a:bodyPr>
+            <a:normAutofit/>
+          </a:bodyPr>
+          <a:lstStyle/>
+          <a:p>
+            <a:pPr>
+              <a:buFont typeface="+mj-lt"/>
+              <a:buAutoNum type="arabicPeriod"/>
+            </a:pPr>
+            <a:r>
+              <a:rPr lang="en-US" sz="2400" dirty="0" smtClean="0"/>
+              <a:t>One-time setup: Install the DITA for Publishers EPUB plugin to the DITA Open Toolkit (out of the box with </a:t>
+            </a:r>
+            <a:r>
+              <a:rPr lang="en-US" sz="2400" dirty="0" err="1" smtClean="0"/>
+              <a:t>oXygenXML</a:t>
+            </a:r>
+            <a:r>
+              <a:rPr lang="en-US" sz="2400" dirty="0" smtClean="0"/>
+              <a:t>)</a:t>
+            </a:r>
+          </a:p>
+          <a:p>
+            <a:pPr>
+              <a:buFont typeface="+mj-lt"/>
+              <a:buAutoNum type="arabicPeriod"/>
+            </a:pPr>
+            <a:r>
+              <a:rPr lang="en-US" sz="2400" dirty="0" smtClean="0"/>
+              <a:t>Run the Open Toolkit “</a:t>
+            </a:r>
+            <a:r>
+              <a:rPr lang="en-US" sz="2400" dirty="0" err="1" smtClean="0"/>
+              <a:t>epub</a:t>
+            </a:r>
+            <a:r>
+              <a:rPr lang="en-US" sz="2400" dirty="0" smtClean="0"/>
+              <a:t>” transformation type against the publication map.</a:t>
             </a:r>
           </a:p>
         </p:txBody>
@@ -7252,25 +7163,47 @@
       </p:grpSpPr>
       <p:sp>
         <p:nvSpPr>
+          <p:cNvPr id="4" name="Title 3"/>
+          <p:cNvSpPr>
+            <a:spLocks noGrp="1"/>
+          </p:cNvSpPr>
+          <p:nvPr>
+            <p:ph type="title"/>
+          </p:nvPr>
+        </p:nvSpPr>
+        <p:spPr/>
+        <p:txBody>
+          <a:bodyPr>
+            <a:normAutofit/>
+          </a:bodyPr>
+          <a:lstStyle/>
+          <a:p>
+            <a:r>
+              <a:rPr lang="en-US" dirty="0"/>
+              <a:t>So what have we seen?</a:t>
+            </a:r>
+          </a:p>
+        </p:txBody>
+      </p:sp>
+      <p:sp>
+        <p:nvSpPr>
           <p:cNvPr id="5" name="Content Placeholder 4"/>
           <p:cNvSpPr>
             <a:spLocks noGrp="1"/>
           </p:cNvSpPr>
           <p:nvPr>
-            <p:ph sz="half" idx="4294967295"/>
+            <p:ph idx="1"/>
           </p:nvPr>
         </p:nvSpPr>
         <p:spPr>
-          <a:xfrm>
-            <a:off x="541470" y="3077156"/>
-            <a:ext cx="9440189" cy="3461759"/>
-          </a:xfrm>
           <a:prstGeom prst="rect">
             <a:avLst/>
           </a:prstGeom>
         </p:spPr>
         <p:txBody>
-          <a:bodyPr/>
+          <a:bodyPr>
+            <a:normAutofit/>
+          </a:bodyPr>
           <a:lstStyle/>
           <a:p>
             <a:r>
@@ -7280,14 +7213,13 @@
           </a:p>
           <a:p>
             <a:r>
-              <a:rPr lang="en-US" dirty="0"/>
+              <a:rPr lang="en-US" sz="2400" dirty="0"/>
               <a:t>Ease of combining content from different companies</a:t>
             </a:r>
-            <a:endParaRPr lang="en-US" sz="2400" dirty="0"/>
-          </a:p>
-          <a:p>
-            <a:r>
-              <a:rPr lang="en-US" dirty="0"/>
+          </a:p>
+          <a:p>
+            <a:r>
+              <a:rPr lang="en-US" sz="2400" dirty="0"/>
               <a:t>Ease of publishing content to a new delivery format (EPUB)</a:t>
             </a:r>
           </a:p>
@@ -7300,43 +7232,10 @@
           </a:p>
           <a:p>
             <a:r>
-              <a:rPr lang="en-US" dirty="0" smtClean="0"/>
-              <a:t>Using the DITA for Publishers EPUB transformation type to produce publication-ready EPUBs from </a:t>
-            </a:r>
-            <a:r>
-              <a:rPr lang="en-US" smtClean="0"/>
-              <a:t>DITA content.</a:t>
+              <a:rPr lang="en-US" sz="2400" dirty="0" smtClean="0"/>
+              <a:t>Using the DITA for Publishers EPUB transformation type to produce publication-ready EPUBs from DITA content.</a:t>
             </a:r>
             <a:endParaRPr lang="en-US" sz="2400" dirty="0"/>
-          </a:p>
-        </p:txBody>
-      </p:sp>
-      <p:sp>
-        <p:nvSpPr>
-          <p:cNvPr id="4" name="Title 3"/>
-          <p:cNvSpPr>
-            <a:spLocks noGrp="1"/>
-          </p:cNvSpPr>
-          <p:nvPr>
-            <p:ph type="title"/>
-          </p:nvPr>
-        </p:nvSpPr>
-        <p:spPr>
-          <a:xfrm>
-            <a:off x="541470" y="1086366"/>
-            <a:ext cx="6262009" cy="640080"/>
-          </a:xfrm>
-        </p:spPr>
-        <p:txBody>
-          <a:bodyPr>
-            <a:normAutofit fontScale="90000"/>
-          </a:bodyPr>
-          <a:lstStyle/>
-          <a:p>
-            <a:r>
-              <a:rPr lang="en-US" dirty="0"/>
-              <a:t>So what have we seen?</a:t>
-            </a:r>
           </a:p>
         </p:txBody>
       </p:sp>

</xml_diff>